<commit_message>
lending club case study analysis - 2
</commit_message>
<xml_diff>
--- a/LendingClubCasestudy.pptx
+++ b/LendingClubCasestudy.pptx
@@ -4089,7 +4089,6 @@
               <a:rPr lang="en-US" sz="2000" dirty="0"/>
               <a:t> correlation between annual income to loan amount (0.42) , there 40 % chance that higher income individuals apply to higher loan amounts.</a:t>
             </a:r>
-            <a:endParaRPr lang="en-US" sz="2000" dirty="0"/>
           </a:p>
         </p:txBody>
       </p:sp>
@@ -4631,8 +4630,8 @@
         </p:nvSpPr>
         <p:spPr bwMode="auto">
           <a:xfrm>
-            <a:off x="0" y="2096334"/>
-            <a:ext cx="12192000" cy="2308324"/>
+            <a:off x="183288" y="1783901"/>
+            <a:ext cx="12008712" cy="1477328"/>
           </a:xfrm>
           <a:prstGeom prst="rect">
             <a:avLst/>
@@ -4676,21 +4675,12 @@
             </a:pPr>
             <a:r>
               <a:rPr lang="en-US" dirty="0"/>
-              <a:t>If the applicant is not likely to repay the loan, i.e. he/she is likely to default, then approving the loan may lead to a financial loss for the company.</a:t>
-            </a:r>
-          </a:p>
-          <a:p>
-            <a:pPr marL="285750" indent="-285750">
-              <a:buFont typeface="Wingdings" panose="05000000000000000000" pitchFamily="2" charset="2"/>
-              <a:buChar char="§"/>
-            </a:pPr>
-            <a:endParaRPr lang="en-US" dirty="0"/>
-          </a:p>
-          <a:p>
-            <a:pPr marL="285750" indent="-285750">
-              <a:buFont typeface="Wingdings" panose="05000000000000000000" pitchFamily="2" charset="2"/>
-              <a:buChar char="§"/>
-            </a:pPr>
+              <a:t>If the applicant is not likely to repay the loan, i.e. he/she is likely to default, then approving the loan may lead to a financial loss for the company</a:t>
+            </a:r>
+            <a:r>
+              <a:rPr lang="en-US" dirty="0" smtClean="0"/>
+              <a:t>.</a:t>
+            </a:r>
             <a:endParaRPr lang="en-US" dirty="0"/>
           </a:p>
         </p:txBody>
@@ -4711,8 +4701,8 @@
         </p:nvSpPr>
         <p:spPr bwMode="auto">
           <a:xfrm>
-            <a:off x="0" y="3786563"/>
-            <a:ext cx="11826240" cy="3139321"/>
+            <a:off x="183288" y="3471109"/>
+            <a:ext cx="12008712" cy="2862322"/>
           </a:xfrm>
           <a:prstGeom prst="rect">
             <a:avLst/>
@@ -5424,11 +5414,7 @@
             </a:r>
             <a:r>
               <a:rPr lang="en-US" dirty="0" smtClean="0"/>
-              <a:t> value for 36 months tenure</a:t>
-            </a:r>
-            <a:r>
-              <a:rPr lang="en-US" dirty="0" smtClean="0"/>
-              <a:t>.</a:t>
+              <a:t> value for 36 months tenure.</a:t>
             </a:r>
           </a:p>
           <a:p>
@@ -6222,15 +6208,7 @@
             </a:r>
             <a:r>
               <a:rPr lang="en-US" dirty="0" smtClean="0"/>
-              <a:t>correlation between </a:t>
-            </a:r>
-            <a:r>
-              <a:rPr lang="en-US" dirty="0" smtClean="0"/>
-              <a:t>quantitative </a:t>
-            </a:r>
-            <a:r>
-              <a:rPr lang="en-US" dirty="0" smtClean="0"/>
-              <a:t>variables.</a:t>
+              <a:t>correlation between quantitative variables.</a:t>
             </a:r>
             <a:endParaRPr lang="en-US" dirty="0"/>
           </a:p>

</xml_diff>